<commit_message>
update D 101 & 102
</commit_message>
<xml_diff>
--- a/Presentatie/Docker101.pptx
+++ b/Presentatie/Docker101.pptx
@@ -8639,6 +8639,10 @@
             <a:r>
               <a:rPr lang="en-US" dirty="0" smtClean="0"/>
               <a:t>WORKS ON </a:t>
+            </a:r>
+            <a:r>
+              <a:rPr lang="en-US" dirty="0" smtClean="0"/>
+              <a:t>MY </a:t>
             </a:r>
             <a:r>
               <a:rPr lang="en-US" dirty="0" err="1" smtClean="0"/>
@@ -40617,21 +40621,6 @@
 </file>
 
 <file path=customXml/item1.xml><?xml version="1.0" encoding="utf-8"?>
-<p:properties xmlns:p="http://schemas.microsoft.com/office/2006/metadata/properties" xmlns:xsi="http://www.w3.org/2001/XMLSchema-instance" xmlns:pc="http://schemas.microsoft.com/office/infopath/2007/PartnerControls">
-  <documentManagement/>
-</p:properties>
-</file>
-
-<file path=customXml/item2.xml><?xml version="1.0" encoding="utf-8"?>
-<?mso-contentType ?>
-<FormTemplates xmlns="http://schemas.microsoft.com/sharepoint/v3/contenttype/forms">
-  <Display>DocumentLibraryForm</Display>
-  <Edit>DocumentLibraryForm</Edit>
-  <New>DocumentLibraryForm</New>
-</FormTemplates>
-</file>
-
-<file path=customXml/item3.xml><?xml version="1.0" encoding="utf-8"?>
 <ct:contentTypeSchema xmlns:ct="http://schemas.microsoft.com/office/2006/metadata/contentType" xmlns:ma="http://schemas.microsoft.com/office/2006/metadata/properties/metaAttributes" ct:_="" ma:_="" ma:contentTypeName="Document" ma:contentTypeID="0x0101009843F10021B1B74BA5DD583B6999787F" ma:contentTypeVersion="1" ma:contentTypeDescription="Een nieuw document maken." ma:contentTypeScope="" ma:versionID="9fe8e6bb692149f7f6309adc5fa49803">
   <xsd:schema xmlns:xsd="http://www.w3.org/2001/XMLSchema" xmlns:xs="http://www.w3.org/2001/XMLSchema" xmlns:p="http://schemas.microsoft.com/office/2006/metadata/properties" targetNamespace="http://schemas.microsoft.com/office/2006/metadata/properties" ma:root="true" ma:fieldsID="eba296b9b19381bc8f01ad6905184223">
     <xsd:element name="properties">
@@ -40745,7 +40734,38 @@
 </ct:contentTypeSchema>
 </file>
 
+<file path=customXml/item2.xml><?xml version="1.0" encoding="utf-8"?>
+<p:properties xmlns:p="http://schemas.microsoft.com/office/2006/metadata/properties" xmlns:xsi="http://www.w3.org/2001/XMLSchema-instance" xmlns:pc="http://schemas.microsoft.com/office/infopath/2007/PartnerControls">
+  <documentManagement/>
+</p:properties>
+</file>
+
+<file path=customXml/item3.xml><?xml version="1.0" encoding="utf-8"?>
+<?mso-contentType ?>
+<FormTemplates xmlns="http://schemas.microsoft.com/sharepoint/v3/contenttype/forms">
+  <Display>DocumentLibraryForm</Display>
+  <Edit>DocumentLibraryForm</Edit>
+  <New>DocumentLibraryForm</New>
+</FormTemplates>
+</file>
+
 <file path=customXml/itemProps1.xml><?xml version="1.0" encoding="utf-8"?>
+<ds:datastoreItem xmlns:ds="http://schemas.openxmlformats.org/officeDocument/2006/customXml" ds:itemID="{F6916CFB-C98C-4D26-B77C-F1E6DDC5B92D}">
+  <ds:schemaRefs>
+    <ds:schemaRef ds:uri="http://schemas.microsoft.com/office/2006/metadata/contentType"/>
+    <ds:schemaRef ds:uri="http://schemas.microsoft.com/office/2006/metadata/properties/metaAttributes"/>
+    <ds:schemaRef ds:uri="http://www.w3.org/2001/XMLSchema"/>
+    <ds:schemaRef ds:uri="http://schemas.microsoft.com/office/2006/metadata/properties"/>
+    <ds:schemaRef ds:uri="http://schemas.openxmlformats.org/package/2006/metadata/core-properties"/>
+    <ds:schemaRef ds:uri="http://purl.org/dc/elements/1.1/"/>
+    <ds:schemaRef ds:uri="http://purl.org/dc/terms/"/>
+    <ds:schemaRef ds:uri="http://schemas.microsoft.com/internal/obd"/>
+    <ds:schemaRef ds:uri="http://schemas.microsoft.com/office/infopath/2007/PartnerControls"/>
+  </ds:schemaRefs>
+</ds:datastoreItem>
+</file>
+
+<file path=customXml/itemProps2.xml><?xml version="1.0" encoding="utf-8"?>
 <ds:datastoreItem xmlns:ds="http://schemas.openxmlformats.org/officeDocument/2006/customXml" ds:itemID="{DE0A3E1F-B2EC-4B36-9F71-3169FFDE4AE0}">
   <ds:schemaRefs>
     <ds:schemaRef ds:uri="http://schemas.microsoft.com/office/2006/metadata/properties"/>
@@ -40760,26 +40780,10 @@
 </ds:datastoreItem>
 </file>
 
-<file path=customXml/itemProps2.xml><?xml version="1.0" encoding="utf-8"?>
+<file path=customXml/itemProps3.xml><?xml version="1.0" encoding="utf-8"?>
 <ds:datastoreItem xmlns:ds="http://schemas.openxmlformats.org/officeDocument/2006/customXml" ds:itemID="{4A752D92-0ACC-48D2-A658-AB744FE70ECE}">
   <ds:schemaRefs>
     <ds:schemaRef ds:uri="http://schemas.microsoft.com/sharepoint/v3/contenttype/forms"/>
   </ds:schemaRefs>
 </ds:datastoreItem>
-</file>
-
-<file path=customXml/itemProps3.xml><?xml version="1.0" encoding="utf-8"?>
-<ds:datastoreItem xmlns:ds="http://schemas.openxmlformats.org/officeDocument/2006/customXml" ds:itemID="{F6916CFB-C98C-4D26-B77C-F1E6DDC5B92D}">
-  <ds:schemaRefs>
-    <ds:schemaRef ds:uri="http://schemas.microsoft.com/office/2006/metadata/contentType"/>
-    <ds:schemaRef ds:uri="http://schemas.microsoft.com/office/2006/metadata/properties/metaAttributes"/>
-    <ds:schemaRef ds:uri="http://www.w3.org/2001/XMLSchema"/>
-    <ds:schemaRef ds:uri="http://schemas.microsoft.com/office/2006/metadata/properties"/>
-    <ds:schemaRef ds:uri="http://schemas.openxmlformats.org/package/2006/metadata/core-properties"/>
-    <ds:schemaRef ds:uri="http://purl.org/dc/elements/1.1/"/>
-    <ds:schemaRef ds:uri="http://purl.org/dc/terms/"/>
-    <ds:schemaRef ds:uri="http://schemas.microsoft.com/internal/obd"/>
-    <ds:schemaRef ds:uri="http://schemas.microsoft.com/office/infopath/2007/PartnerControls"/>
-  </ds:schemaRefs>
-</ds:datastoreItem>
 </file>
</xml_diff>